<commit_message>
plot CDF of all experiments
</commit_message>
<xml_diff>
--- a/graph/新增 Microsoft PowerPoint 簡報.pptx
+++ b/graph/新增 Microsoft PowerPoint 簡報.pptx
@@ -5,8 +5,20 @@
     <p:sldMasterId id="2147483648" r:id="rId1"/>
   </p:sldMasterIdLst>
   <p:sldIdLst>
-    <p:sldId id="257" r:id="rId2"/>
-    <p:sldId id="256" r:id="rId3"/>
+    <p:sldId id="256" r:id="rId2"/>
+    <p:sldId id="257" r:id="rId3"/>
+    <p:sldId id="258" r:id="rId4"/>
+    <p:sldId id="259" r:id="rId5"/>
+    <p:sldId id="260" r:id="rId6"/>
+    <p:sldId id="261" r:id="rId7"/>
+    <p:sldId id="262" r:id="rId8"/>
+    <p:sldId id="263" r:id="rId9"/>
+    <p:sldId id="264" r:id="rId10"/>
+    <p:sldId id="265" r:id="rId11"/>
+    <p:sldId id="266" r:id="rId12"/>
+    <p:sldId id="267" r:id="rId13"/>
+    <p:sldId id="268" r:id="rId14"/>
+    <p:sldId id="269" r:id="rId15"/>
   </p:sldIdLst>
   <p:sldSz cx="12192000" cy="6858000"/>
   <p:notesSz cx="6858000" cy="9144000"/>
@@ -260,7 +272,7 @@
           <a:p>
             <a:fld id="{184BF93B-8914-47D8-849D-5823D7A81DB3}" type="datetimeFigureOut">
               <a:rPr lang="zh-TW" altLang="en-US" smtClean="0"/>
-              <a:t>2024/6/25</a:t>
+              <a:t>2024/7/1</a:t>
             </a:fld>
             <a:endParaRPr lang="zh-TW" altLang="en-US"/>
           </a:p>
@@ -458,7 +470,7 @@
           <a:p>
             <a:fld id="{184BF93B-8914-47D8-849D-5823D7A81DB3}" type="datetimeFigureOut">
               <a:rPr lang="zh-TW" altLang="en-US" smtClean="0"/>
-              <a:t>2024/6/25</a:t>
+              <a:t>2024/7/1</a:t>
             </a:fld>
             <a:endParaRPr lang="zh-TW" altLang="en-US"/>
           </a:p>
@@ -666,7 +678,7 @@
           <a:p>
             <a:fld id="{184BF93B-8914-47D8-849D-5823D7A81DB3}" type="datetimeFigureOut">
               <a:rPr lang="zh-TW" altLang="en-US" smtClean="0"/>
-              <a:t>2024/6/25</a:t>
+              <a:t>2024/7/1</a:t>
             </a:fld>
             <a:endParaRPr lang="zh-TW" altLang="en-US"/>
           </a:p>
@@ -864,7 +876,7 @@
           <a:p>
             <a:fld id="{184BF93B-8914-47D8-849D-5823D7A81DB3}" type="datetimeFigureOut">
               <a:rPr lang="zh-TW" altLang="en-US" smtClean="0"/>
-              <a:t>2024/6/25</a:t>
+              <a:t>2024/7/1</a:t>
             </a:fld>
             <a:endParaRPr lang="zh-TW" altLang="en-US"/>
           </a:p>
@@ -1139,7 +1151,7 @@
           <a:p>
             <a:fld id="{184BF93B-8914-47D8-849D-5823D7A81DB3}" type="datetimeFigureOut">
               <a:rPr lang="zh-TW" altLang="en-US" smtClean="0"/>
-              <a:t>2024/6/25</a:t>
+              <a:t>2024/7/1</a:t>
             </a:fld>
             <a:endParaRPr lang="zh-TW" altLang="en-US"/>
           </a:p>
@@ -1404,7 +1416,7 @@
           <a:p>
             <a:fld id="{184BF93B-8914-47D8-849D-5823D7A81DB3}" type="datetimeFigureOut">
               <a:rPr lang="zh-TW" altLang="en-US" smtClean="0"/>
-              <a:t>2024/6/25</a:t>
+              <a:t>2024/7/1</a:t>
             </a:fld>
             <a:endParaRPr lang="zh-TW" altLang="en-US"/>
           </a:p>
@@ -1816,7 +1828,7 @@
           <a:p>
             <a:fld id="{184BF93B-8914-47D8-849D-5823D7A81DB3}" type="datetimeFigureOut">
               <a:rPr lang="zh-TW" altLang="en-US" smtClean="0"/>
-              <a:t>2024/6/25</a:t>
+              <a:t>2024/7/1</a:t>
             </a:fld>
             <a:endParaRPr lang="zh-TW" altLang="en-US"/>
           </a:p>
@@ -1957,7 +1969,7 @@
           <a:p>
             <a:fld id="{184BF93B-8914-47D8-849D-5823D7A81DB3}" type="datetimeFigureOut">
               <a:rPr lang="zh-TW" altLang="en-US" smtClean="0"/>
-              <a:t>2024/6/25</a:t>
+              <a:t>2024/7/1</a:t>
             </a:fld>
             <a:endParaRPr lang="zh-TW" altLang="en-US"/>
           </a:p>
@@ -2070,7 +2082,7 @@
           <a:p>
             <a:fld id="{184BF93B-8914-47D8-849D-5823D7A81DB3}" type="datetimeFigureOut">
               <a:rPr lang="zh-TW" altLang="en-US" smtClean="0"/>
-              <a:t>2024/6/25</a:t>
+              <a:t>2024/7/1</a:t>
             </a:fld>
             <a:endParaRPr lang="zh-TW" altLang="en-US"/>
           </a:p>
@@ -2381,7 +2393,7 @@
           <a:p>
             <a:fld id="{184BF93B-8914-47D8-849D-5823D7A81DB3}" type="datetimeFigureOut">
               <a:rPr lang="zh-TW" altLang="en-US" smtClean="0"/>
-              <a:t>2024/6/25</a:t>
+              <a:t>2024/7/1</a:t>
             </a:fld>
             <a:endParaRPr lang="zh-TW" altLang="en-US"/>
           </a:p>
@@ -2669,7 +2681,7 @@
           <a:p>
             <a:fld id="{184BF93B-8914-47D8-849D-5823D7A81DB3}" type="datetimeFigureOut">
               <a:rPr lang="zh-TW" altLang="en-US" smtClean="0"/>
-              <a:t>2024/6/25</a:t>
+              <a:t>2024/7/1</a:t>
             </a:fld>
             <a:endParaRPr lang="zh-TW" altLang="en-US"/>
           </a:p>
@@ -2910,7 +2922,7 @@
           <a:p>
             <a:fld id="{184BF93B-8914-47D8-849D-5823D7A81DB3}" type="datetimeFigureOut">
               <a:rPr lang="zh-TW" altLang="en-US" smtClean="0"/>
-              <a:t>2024/6/25</a:t>
+              <a:t>2024/7/1</a:t>
             </a:fld>
             <a:endParaRPr lang="zh-TW" altLang="en-US"/>
           </a:p>
@@ -3329,10 +3341,10 @@
       </p:grpSpPr>
       <p:pic>
         <p:nvPicPr>
-          <p:cNvPr id="7" name="圖片 6">
-            <a:extLst>
-              <a:ext uri="{FF2B5EF4-FFF2-40B4-BE49-F238E27FC236}">
-                <a16:creationId xmlns:a16="http://schemas.microsoft.com/office/drawing/2014/main" id="{028E8FFD-041C-4C6B-A558-9576E9BC9F54}"/>
+          <p:cNvPr id="2" name="圖片 1">
+            <a:extLst>
+              <a:ext uri="{FF2B5EF4-FFF2-40B4-BE49-F238E27FC236}">
+                <a16:creationId xmlns:a16="http://schemas.microsoft.com/office/drawing/2014/main" id="{4B0E58A9-6061-4F37-99EF-1F72F5ECF795}"/>
               </a:ext>
             </a:extLst>
           </p:cNvPr>
@@ -3360,7 +3372,307 @@
     </p:spTree>
     <p:extLst>
       <p:ext uri="{BB962C8B-B14F-4D97-AF65-F5344CB8AC3E}">
-        <p14:creationId xmlns:p14="http://schemas.microsoft.com/office/powerpoint/2010/main" val="3228314868"/>
+        <p14:creationId xmlns:p14="http://schemas.microsoft.com/office/powerpoint/2010/main" val="3161395100"/>
+      </p:ext>
+    </p:extLst>
+  </p:cSld>
+  <p:clrMapOvr>
+    <a:masterClrMapping/>
+  </p:clrMapOvr>
+</p:sld>
+</file>
+
+<file path=ppt/slides/slide10.xml><?xml version="1.0" encoding="utf-8"?>
+<p:sld xmlns:a="http://schemas.openxmlformats.org/drawingml/2006/main" xmlns:r="http://schemas.openxmlformats.org/officeDocument/2006/relationships" xmlns:p="http://schemas.openxmlformats.org/presentationml/2006/main">
+  <p:cSld>
+    <p:spTree>
+      <p:nvGrpSpPr>
+        <p:cNvPr id="1" name=""/>
+        <p:cNvGrpSpPr/>
+        <p:nvPr/>
+      </p:nvGrpSpPr>
+      <p:grpSpPr>
+        <a:xfrm>
+          <a:off x="0" y="0"/>
+          <a:ext cx="0" cy="0"/>
+          <a:chOff x="0" y="0"/>
+          <a:chExt cx="0" cy="0"/>
+        </a:xfrm>
+      </p:grpSpPr>
+      <p:pic>
+        <p:nvPicPr>
+          <p:cNvPr id="2" name="圖片 1">
+            <a:extLst>
+              <a:ext uri="{FF2B5EF4-FFF2-40B4-BE49-F238E27FC236}">
+                <a16:creationId xmlns:a16="http://schemas.microsoft.com/office/drawing/2014/main" id="{EC202FB8-A4CD-4A70-AF33-DE1FCE341ED7}"/>
+              </a:ext>
+            </a:extLst>
+          </p:cNvPr>
+          <p:cNvPicPr>
+            <a:picLocks noChangeAspect="1"/>
+          </p:cNvPicPr>
+          <p:nvPr/>
+        </p:nvPicPr>
+        <p:blipFill>
+          <a:blip r:embed="rId2"/>
+          <a:stretch>
+            <a:fillRect/>
+          </a:stretch>
+        </p:blipFill>
+        <p:spPr>
+          <a:xfrm>
+            <a:off x="0" y="579279"/>
+            <a:ext cx="12192000" cy="5699442"/>
+          </a:xfrm>
+          <a:prstGeom prst="rect">
+            <a:avLst/>
+          </a:prstGeom>
+        </p:spPr>
+      </p:pic>
+    </p:spTree>
+    <p:extLst>
+      <p:ext uri="{BB962C8B-B14F-4D97-AF65-F5344CB8AC3E}">
+        <p14:creationId xmlns:p14="http://schemas.microsoft.com/office/powerpoint/2010/main" val="1957715654"/>
+      </p:ext>
+    </p:extLst>
+  </p:cSld>
+  <p:clrMapOvr>
+    <a:masterClrMapping/>
+  </p:clrMapOvr>
+</p:sld>
+</file>
+
+<file path=ppt/slides/slide11.xml><?xml version="1.0" encoding="utf-8"?>
+<p:sld xmlns:a="http://schemas.openxmlformats.org/drawingml/2006/main" xmlns:r="http://schemas.openxmlformats.org/officeDocument/2006/relationships" xmlns:p="http://schemas.openxmlformats.org/presentationml/2006/main">
+  <p:cSld>
+    <p:spTree>
+      <p:nvGrpSpPr>
+        <p:cNvPr id="1" name=""/>
+        <p:cNvGrpSpPr/>
+        <p:nvPr/>
+      </p:nvGrpSpPr>
+      <p:grpSpPr>
+        <a:xfrm>
+          <a:off x="0" y="0"/>
+          <a:ext cx="0" cy="0"/>
+          <a:chOff x="0" y="0"/>
+          <a:chExt cx="0" cy="0"/>
+        </a:xfrm>
+      </p:grpSpPr>
+      <p:pic>
+        <p:nvPicPr>
+          <p:cNvPr id="3" name="圖片 2">
+            <a:extLst>
+              <a:ext uri="{FF2B5EF4-FFF2-40B4-BE49-F238E27FC236}">
+                <a16:creationId xmlns:a16="http://schemas.microsoft.com/office/drawing/2014/main" id="{6A4320EA-F242-420F-88A5-7B1A084A56F6}"/>
+              </a:ext>
+            </a:extLst>
+          </p:cNvPr>
+          <p:cNvPicPr>
+            <a:picLocks noChangeAspect="1"/>
+          </p:cNvPicPr>
+          <p:nvPr/>
+        </p:nvPicPr>
+        <p:blipFill>
+          <a:blip r:embed="rId2"/>
+          <a:stretch>
+            <a:fillRect/>
+          </a:stretch>
+        </p:blipFill>
+        <p:spPr>
+          <a:xfrm>
+            <a:off x="0" y="576759"/>
+            <a:ext cx="12192000" cy="5704482"/>
+          </a:xfrm>
+          <a:prstGeom prst="rect">
+            <a:avLst/>
+          </a:prstGeom>
+        </p:spPr>
+      </p:pic>
+    </p:spTree>
+    <p:extLst>
+      <p:ext uri="{BB962C8B-B14F-4D97-AF65-F5344CB8AC3E}">
+        <p14:creationId xmlns:p14="http://schemas.microsoft.com/office/powerpoint/2010/main" val="1202517395"/>
+      </p:ext>
+    </p:extLst>
+  </p:cSld>
+  <p:clrMapOvr>
+    <a:masterClrMapping/>
+  </p:clrMapOvr>
+</p:sld>
+</file>
+
+<file path=ppt/slides/slide12.xml><?xml version="1.0" encoding="utf-8"?>
+<p:sld xmlns:a="http://schemas.openxmlformats.org/drawingml/2006/main" xmlns:r="http://schemas.openxmlformats.org/officeDocument/2006/relationships" xmlns:p="http://schemas.openxmlformats.org/presentationml/2006/main">
+  <p:cSld>
+    <p:spTree>
+      <p:nvGrpSpPr>
+        <p:cNvPr id="1" name=""/>
+        <p:cNvGrpSpPr/>
+        <p:nvPr/>
+      </p:nvGrpSpPr>
+      <p:grpSpPr>
+        <a:xfrm>
+          <a:off x="0" y="0"/>
+          <a:ext cx="0" cy="0"/>
+          <a:chOff x="0" y="0"/>
+          <a:chExt cx="0" cy="0"/>
+        </a:xfrm>
+      </p:grpSpPr>
+      <p:pic>
+        <p:nvPicPr>
+          <p:cNvPr id="2" name="圖片 1">
+            <a:extLst>
+              <a:ext uri="{FF2B5EF4-FFF2-40B4-BE49-F238E27FC236}">
+                <a16:creationId xmlns:a16="http://schemas.microsoft.com/office/drawing/2014/main" id="{894FBD2E-0C70-43CC-924C-F0C69D461F1A}"/>
+              </a:ext>
+            </a:extLst>
+          </p:cNvPr>
+          <p:cNvPicPr>
+            <a:picLocks noChangeAspect="1"/>
+          </p:cNvPicPr>
+          <p:nvPr/>
+        </p:nvPicPr>
+        <p:blipFill>
+          <a:blip r:embed="rId2"/>
+          <a:stretch>
+            <a:fillRect/>
+          </a:stretch>
+        </p:blipFill>
+        <p:spPr>
+          <a:xfrm>
+            <a:off x="0" y="579279"/>
+            <a:ext cx="12192000" cy="5699442"/>
+          </a:xfrm>
+          <a:prstGeom prst="rect">
+            <a:avLst/>
+          </a:prstGeom>
+        </p:spPr>
+      </p:pic>
+    </p:spTree>
+    <p:extLst>
+      <p:ext uri="{BB962C8B-B14F-4D97-AF65-F5344CB8AC3E}">
+        <p14:creationId xmlns:p14="http://schemas.microsoft.com/office/powerpoint/2010/main" val="2919015027"/>
+      </p:ext>
+    </p:extLst>
+  </p:cSld>
+  <p:clrMapOvr>
+    <a:masterClrMapping/>
+  </p:clrMapOvr>
+</p:sld>
+</file>
+
+<file path=ppt/slides/slide13.xml><?xml version="1.0" encoding="utf-8"?>
+<p:sld xmlns:a="http://schemas.openxmlformats.org/drawingml/2006/main" xmlns:r="http://schemas.openxmlformats.org/officeDocument/2006/relationships" xmlns:p="http://schemas.openxmlformats.org/presentationml/2006/main">
+  <p:cSld>
+    <p:spTree>
+      <p:nvGrpSpPr>
+        <p:cNvPr id="1" name=""/>
+        <p:cNvGrpSpPr/>
+        <p:nvPr/>
+      </p:nvGrpSpPr>
+      <p:grpSpPr>
+        <a:xfrm>
+          <a:off x="0" y="0"/>
+          <a:ext cx="0" cy="0"/>
+          <a:chOff x="0" y="0"/>
+          <a:chExt cx="0" cy="0"/>
+        </a:xfrm>
+      </p:grpSpPr>
+      <p:pic>
+        <p:nvPicPr>
+          <p:cNvPr id="3" name="圖片 2">
+            <a:extLst>
+              <a:ext uri="{FF2B5EF4-FFF2-40B4-BE49-F238E27FC236}">
+                <a16:creationId xmlns:a16="http://schemas.microsoft.com/office/drawing/2014/main" id="{FBB85537-1589-4F73-B1F1-20C8CBF86EE3}"/>
+              </a:ext>
+            </a:extLst>
+          </p:cNvPr>
+          <p:cNvPicPr>
+            <a:picLocks noChangeAspect="1"/>
+          </p:cNvPicPr>
+          <p:nvPr/>
+        </p:nvPicPr>
+        <p:blipFill>
+          <a:blip r:embed="rId2"/>
+          <a:stretch>
+            <a:fillRect/>
+          </a:stretch>
+        </p:blipFill>
+        <p:spPr>
+          <a:xfrm>
+            <a:off x="0" y="578476"/>
+            <a:ext cx="12192000" cy="5701048"/>
+          </a:xfrm>
+          <a:prstGeom prst="rect">
+            <a:avLst/>
+          </a:prstGeom>
+        </p:spPr>
+      </p:pic>
+    </p:spTree>
+    <p:extLst>
+      <p:ext uri="{BB962C8B-B14F-4D97-AF65-F5344CB8AC3E}">
+        <p14:creationId xmlns:p14="http://schemas.microsoft.com/office/powerpoint/2010/main" val="2232347874"/>
+      </p:ext>
+    </p:extLst>
+  </p:cSld>
+  <p:clrMapOvr>
+    <a:masterClrMapping/>
+  </p:clrMapOvr>
+</p:sld>
+</file>
+
+<file path=ppt/slides/slide14.xml><?xml version="1.0" encoding="utf-8"?>
+<p:sld xmlns:a="http://schemas.openxmlformats.org/drawingml/2006/main" xmlns:r="http://schemas.openxmlformats.org/officeDocument/2006/relationships" xmlns:p="http://schemas.openxmlformats.org/presentationml/2006/main">
+  <p:cSld>
+    <p:spTree>
+      <p:nvGrpSpPr>
+        <p:cNvPr id="1" name=""/>
+        <p:cNvGrpSpPr/>
+        <p:nvPr/>
+      </p:nvGrpSpPr>
+      <p:grpSpPr>
+        <a:xfrm>
+          <a:off x="0" y="0"/>
+          <a:ext cx="0" cy="0"/>
+          <a:chOff x="0" y="0"/>
+          <a:chExt cx="0" cy="0"/>
+        </a:xfrm>
+      </p:grpSpPr>
+      <p:pic>
+        <p:nvPicPr>
+          <p:cNvPr id="2" name="圖片 1">
+            <a:extLst>
+              <a:ext uri="{FF2B5EF4-FFF2-40B4-BE49-F238E27FC236}">
+                <a16:creationId xmlns:a16="http://schemas.microsoft.com/office/drawing/2014/main" id="{02D9E844-A5B2-4131-B65A-CC71FE4BB9AA}"/>
+              </a:ext>
+            </a:extLst>
+          </p:cNvPr>
+          <p:cNvPicPr>
+            <a:picLocks noChangeAspect="1"/>
+          </p:cNvPicPr>
+          <p:nvPr/>
+        </p:nvPicPr>
+        <p:blipFill>
+          <a:blip r:embed="rId2"/>
+          <a:stretch>
+            <a:fillRect/>
+          </a:stretch>
+        </p:blipFill>
+        <p:spPr>
+          <a:xfrm>
+            <a:off x="0" y="597618"/>
+            <a:ext cx="12192000" cy="5662764"/>
+          </a:xfrm>
+          <a:prstGeom prst="rect">
+            <a:avLst/>
+          </a:prstGeom>
+        </p:spPr>
+      </p:pic>
+    </p:spTree>
+    <p:extLst>
+      <p:ext uri="{BB962C8B-B14F-4D97-AF65-F5344CB8AC3E}">
+        <p14:creationId xmlns:p14="http://schemas.microsoft.com/office/powerpoint/2010/main" val="3183751561"/>
       </p:ext>
     </p:extLst>
   </p:cSld>
@@ -3389,10 +3701,10 @@
       </p:grpSpPr>
       <p:pic>
         <p:nvPicPr>
-          <p:cNvPr id="8" name="圖片 7">
-            <a:extLst>
-              <a:ext uri="{FF2B5EF4-FFF2-40B4-BE49-F238E27FC236}">
-                <a16:creationId xmlns:a16="http://schemas.microsoft.com/office/drawing/2014/main" id="{87DD206F-7C2C-46DA-AF8B-29D287EDDC72}"/>
+          <p:cNvPr id="2" name="圖片 1">
+            <a:extLst>
+              <a:ext uri="{FF2B5EF4-FFF2-40B4-BE49-F238E27FC236}">
+                <a16:creationId xmlns:a16="http://schemas.microsoft.com/office/drawing/2014/main" id="{C3865A97-E56F-48D3-A50A-FDB481B04D0D}"/>
               </a:ext>
             </a:extLst>
           </p:cNvPr>
@@ -3409,8 +3721,8 @@
         </p:blipFill>
         <p:spPr>
           <a:xfrm>
-            <a:off x="-6058" y="594804"/>
-            <a:ext cx="12198058" cy="5665578"/>
+            <a:off x="0" y="579279"/>
+            <a:ext cx="12192000" cy="5699442"/>
           </a:xfrm>
           <a:prstGeom prst="rect">
             <a:avLst/>
@@ -3420,7 +3732,427 @@
     </p:spTree>
     <p:extLst>
       <p:ext uri="{BB962C8B-B14F-4D97-AF65-F5344CB8AC3E}">
-        <p14:creationId xmlns:p14="http://schemas.microsoft.com/office/powerpoint/2010/main" val="3161395100"/>
+        <p14:creationId xmlns:p14="http://schemas.microsoft.com/office/powerpoint/2010/main" val="3228314868"/>
+      </p:ext>
+    </p:extLst>
+  </p:cSld>
+  <p:clrMapOvr>
+    <a:masterClrMapping/>
+  </p:clrMapOvr>
+</p:sld>
+</file>
+
+<file path=ppt/slides/slide3.xml><?xml version="1.0" encoding="utf-8"?>
+<p:sld xmlns:a="http://schemas.openxmlformats.org/drawingml/2006/main" xmlns:r="http://schemas.openxmlformats.org/officeDocument/2006/relationships" xmlns:p="http://schemas.openxmlformats.org/presentationml/2006/main">
+  <p:cSld>
+    <p:spTree>
+      <p:nvGrpSpPr>
+        <p:cNvPr id="1" name=""/>
+        <p:cNvGrpSpPr/>
+        <p:nvPr/>
+      </p:nvGrpSpPr>
+      <p:grpSpPr>
+        <a:xfrm>
+          <a:off x="0" y="0"/>
+          <a:ext cx="0" cy="0"/>
+          <a:chOff x="0" y="0"/>
+          <a:chExt cx="0" cy="0"/>
+        </a:xfrm>
+      </p:grpSpPr>
+      <p:pic>
+        <p:nvPicPr>
+          <p:cNvPr id="4" name="圖片 3">
+            <a:extLst>
+              <a:ext uri="{FF2B5EF4-FFF2-40B4-BE49-F238E27FC236}">
+                <a16:creationId xmlns:a16="http://schemas.microsoft.com/office/drawing/2014/main" id="{BE25D470-15B4-4D9A-8285-B77451C35CFF}"/>
+              </a:ext>
+            </a:extLst>
+          </p:cNvPr>
+          <p:cNvPicPr>
+            <a:picLocks noChangeAspect="1"/>
+          </p:cNvPicPr>
+          <p:nvPr/>
+        </p:nvPicPr>
+        <p:blipFill>
+          <a:blip r:embed="rId2"/>
+          <a:stretch>
+            <a:fillRect/>
+          </a:stretch>
+        </p:blipFill>
+        <p:spPr>
+          <a:xfrm>
+            <a:off x="0" y="578476"/>
+            <a:ext cx="12192000" cy="5701048"/>
+          </a:xfrm>
+          <a:prstGeom prst="rect">
+            <a:avLst/>
+          </a:prstGeom>
+        </p:spPr>
+      </p:pic>
+    </p:spTree>
+    <p:extLst>
+      <p:ext uri="{BB962C8B-B14F-4D97-AF65-F5344CB8AC3E}">
+        <p14:creationId xmlns:p14="http://schemas.microsoft.com/office/powerpoint/2010/main" val="1360563731"/>
+      </p:ext>
+    </p:extLst>
+  </p:cSld>
+  <p:clrMapOvr>
+    <a:masterClrMapping/>
+  </p:clrMapOvr>
+</p:sld>
+</file>
+
+<file path=ppt/slides/slide4.xml><?xml version="1.0" encoding="utf-8"?>
+<p:sld xmlns:a="http://schemas.openxmlformats.org/drawingml/2006/main" xmlns:r="http://schemas.openxmlformats.org/officeDocument/2006/relationships" xmlns:p="http://schemas.openxmlformats.org/presentationml/2006/main">
+  <p:cSld>
+    <p:spTree>
+      <p:nvGrpSpPr>
+        <p:cNvPr id="1" name=""/>
+        <p:cNvGrpSpPr/>
+        <p:nvPr/>
+      </p:nvGrpSpPr>
+      <p:grpSpPr>
+        <a:xfrm>
+          <a:off x="0" y="0"/>
+          <a:ext cx="0" cy="0"/>
+          <a:chOff x="0" y="0"/>
+          <a:chExt cx="0" cy="0"/>
+        </a:xfrm>
+      </p:grpSpPr>
+      <p:pic>
+        <p:nvPicPr>
+          <p:cNvPr id="2" name="圖片 1">
+            <a:extLst>
+              <a:ext uri="{FF2B5EF4-FFF2-40B4-BE49-F238E27FC236}">
+                <a16:creationId xmlns:a16="http://schemas.microsoft.com/office/drawing/2014/main" id="{99BB59BC-1B78-437A-9015-FFCC0109DC12}"/>
+              </a:ext>
+            </a:extLst>
+          </p:cNvPr>
+          <p:cNvPicPr>
+            <a:picLocks noChangeAspect="1"/>
+          </p:cNvPicPr>
+          <p:nvPr/>
+        </p:nvPicPr>
+        <p:blipFill>
+          <a:blip r:embed="rId2"/>
+          <a:stretch>
+            <a:fillRect/>
+          </a:stretch>
+        </p:blipFill>
+        <p:spPr>
+          <a:xfrm>
+            <a:off x="0" y="579279"/>
+            <a:ext cx="12192000" cy="5699442"/>
+          </a:xfrm>
+          <a:prstGeom prst="rect">
+            <a:avLst/>
+          </a:prstGeom>
+        </p:spPr>
+      </p:pic>
+    </p:spTree>
+    <p:extLst>
+      <p:ext uri="{BB962C8B-B14F-4D97-AF65-F5344CB8AC3E}">
+        <p14:creationId xmlns:p14="http://schemas.microsoft.com/office/powerpoint/2010/main" val="2960763209"/>
+      </p:ext>
+    </p:extLst>
+  </p:cSld>
+  <p:clrMapOvr>
+    <a:masterClrMapping/>
+  </p:clrMapOvr>
+</p:sld>
+</file>
+
+<file path=ppt/slides/slide5.xml><?xml version="1.0" encoding="utf-8"?>
+<p:sld xmlns:a="http://schemas.openxmlformats.org/drawingml/2006/main" xmlns:r="http://schemas.openxmlformats.org/officeDocument/2006/relationships" xmlns:p="http://schemas.openxmlformats.org/presentationml/2006/main">
+  <p:cSld>
+    <p:spTree>
+      <p:nvGrpSpPr>
+        <p:cNvPr id="1" name=""/>
+        <p:cNvGrpSpPr/>
+        <p:nvPr/>
+      </p:nvGrpSpPr>
+      <p:grpSpPr>
+        <a:xfrm>
+          <a:off x="0" y="0"/>
+          <a:ext cx="0" cy="0"/>
+          <a:chOff x="0" y="0"/>
+          <a:chExt cx="0" cy="0"/>
+        </a:xfrm>
+      </p:grpSpPr>
+      <p:pic>
+        <p:nvPicPr>
+          <p:cNvPr id="3" name="圖片 2">
+            <a:extLst>
+              <a:ext uri="{FF2B5EF4-FFF2-40B4-BE49-F238E27FC236}">
+                <a16:creationId xmlns:a16="http://schemas.microsoft.com/office/drawing/2014/main" id="{8704CEEB-E710-4C34-9B94-6189F67CC72E}"/>
+              </a:ext>
+            </a:extLst>
+          </p:cNvPr>
+          <p:cNvPicPr>
+            <a:picLocks noChangeAspect="1"/>
+          </p:cNvPicPr>
+          <p:nvPr/>
+        </p:nvPicPr>
+        <p:blipFill>
+          <a:blip r:embed="rId2"/>
+          <a:stretch>
+            <a:fillRect/>
+          </a:stretch>
+        </p:blipFill>
+        <p:spPr>
+          <a:xfrm>
+            <a:off x="0" y="576759"/>
+            <a:ext cx="12192000" cy="5704482"/>
+          </a:xfrm>
+          <a:prstGeom prst="rect">
+            <a:avLst/>
+          </a:prstGeom>
+        </p:spPr>
+      </p:pic>
+    </p:spTree>
+    <p:extLst>
+      <p:ext uri="{BB962C8B-B14F-4D97-AF65-F5344CB8AC3E}">
+        <p14:creationId xmlns:p14="http://schemas.microsoft.com/office/powerpoint/2010/main" val="182664919"/>
+      </p:ext>
+    </p:extLst>
+  </p:cSld>
+  <p:clrMapOvr>
+    <a:masterClrMapping/>
+  </p:clrMapOvr>
+</p:sld>
+</file>
+
+<file path=ppt/slides/slide6.xml><?xml version="1.0" encoding="utf-8"?>
+<p:sld xmlns:a="http://schemas.openxmlformats.org/drawingml/2006/main" xmlns:r="http://schemas.openxmlformats.org/officeDocument/2006/relationships" xmlns:p="http://schemas.openxmlformats.org/presentationml/2006/main">
+  <p:cSld>
+    <p:spTree>
+      <p:nvGrpSpPr>
+        <p:cNvPr id="1" name=""/>
+        <p:cNvGrpSpPr/>
+        <p:nvPr/>
+      </p:nvGrpSpPr>
+      <p:grpSpPr>
+        <a:xfrm>
+          <a:off x="0" y="0"/>
+          <a:ext cx="0" cy="0"/>
+          <a:chOff x="0" y="0"/>
+          <a:chExt cx="0" cy="0"/>
+        </a:xfrm>
+      </p:grpSpPr>
+      <p:pic>
+        <p:nvPicPr>
+          <p:cNvPr id="2" name="圖片 1">
+            <a:extLst>
+              <a:ext uri="{FF2B5EF4-FFF2-40B4-BE49-F238E27FC236}">
+                <a16:creationId xmlns:a16="http://schemas.microsoft.com/office/drawing/2014/main" id="{AE442E01-128D-4156-9296-D9A251940B80}"/>
+              </a:ext>
+            </a:extLst>
+          </p:cNvPr>
+          <p:cNvPicPr>
+            <a:picLocks noChangeAspect="1"/>
+          </p:cNvPicPr>
+          <p:nvPr/>
+        </p:nvPicPr>
+        <p:blipFill>
+          <a:blip r:embed="rId2"/>
+          <a:stretch>
+            <a:fillRect/>
+          </a:stretch>
+        </p:blipFill>
+        <p:spPr>
+          <a:xfrm>
+            <a:off x="0" y="579279"/>
+            <a:ext cx="12192000" cy="5699442"/>
+          </a:xfrm>
+          <a:prstGeom prst="rect">
+            <a:avLst/>
+          </a:prstGeom>
+        </p:spPr>
+      </p:pic>
+    </p:spTree>
+    <p:extLst>
+      <p:ext uri="{BB962C8B-B14F-4D97-AF65-F5344CB8AC3E}">
+        <p14:creationId xmlns:p14="http://schemas.microsoft.com/office/powerpoint/2010/main" val="2538430547"/>
+      </p:ext>
+    </p:extLst>
+  </p:cSld>
+  <p:clrMapOvr>
+    <a:masterClrMapping/>
+  </p:clrMapOvr>
+</p:sld>
+</file>
+
+<file path=ppt/slides/slide7.xml><?xml version="1.0" encoding="utf-8"?>
+<p:sld xmlns:a="http://schemas.openxmlformats.org/drawingml/2006/main" xmlns:r="http://schemas.openxmlformats.org/officeDocument/2006/relationships" xmlns:p="http://schemas.openxmlformats.org/presentationml/2006/main">
+  <p:cSld>
+    <p:spTree>
+      <p:nvGrpSpPr>
+        <p:cNvPr id="1" name=""/>
+        <p:cNvGrpSpPr/>
+        <p:nvPr/>
+      </p:nvGrpSpPr>
+      <p:grpSpPr>
+        <a:xfrm>
+          <a:off x="0" y="0"/>
+          <a:ext cx="0" cy="0"/>
+          <a:chOff x="0" y="0"/>
+          <a:chExt cx="0" cy="0"/>
+        </a:xfrm>
+      </p:grpSpPr>
+      <p:pic>
+        <p:nvPicPr>
+          <p:cNvPr id="3" name="圖片 2">
+            <a:extLst>
+              <a:ext uri="{FF2B5EF4-FFF2-40B4-BE49-F238E27FC236}">
+                <a16:creationId xmlns:a16="http://schemas.microsoft.com/office/drawing/2014/main" id="{C008FC22-F1E2-4654-BA46-6D2FC5ABA895}"/>
+              </a:ext>
+            </a:extLst>
+          </p:cNvPr>
+          <p:cNvPicPr>
+            <a:picLocks noChangeAspect="1"/>
+          </p:cNvPicPr>
+          <p:nvPr/>
+        </p:nvPicPr>
+        <p:blipFill>
+          <a:blip r:embed="rId2"/>
+          <a:stretch>
+            <a:fillRect/>
+          </a:stretch>
+        </p:blipFill>
+        <p:spPr>
+          <a:xfrm>
+            <a:off x="0" y="611521"/>
+            <a:ext cx="12192000" cy="5634958"/>
+          </a:xfrm>
+          <a:prstGeom prst="rect">
+            <a:avLst/>
+          </a:prstGeom>
+        </p:spPr>
+      </p:pic>
+    </p:spTree>
+    <p:extLst>
+      <p:ext uri="{BB962C8B-B14F-4D97-AF65-F5344CB8AC3E}">
+        <p14:creationId xmlns:p14="http://schemas.microsoft.com/office/powerpoint/2010/main" val="976479584"/>
+      </p:ext>
+    </p:extLst>
+  </p:cSld>
+  <p:clrMapOvr>
+    <a:masterClrMapping/>
+  </p:clrMapOvr>
+</p:sld>
+</file>
+
+<file path=ppt/slides/slide8.xml><?xml version="1.0" encoding="utf-8"?>
+<p:sld xmlns:a="http://schemas.openxmlformats.org/drawingml/2006/main" xmlns:r="http://schemas.openxmlformats.org/officeDocument/2006/relationships" xmlns:p="http://schemas.openxmlformats.org/presentationml/2006/main">
+  <p:cSld>
+    <p:spTree>
+      <p:nvGrpSpPr>
+        <p:cNvPr id="1" name=""/>
+        <p:cNvGrpSpPr/>
+        <p:nvPr/>
+      </p:nvGrpSpPr>
+      <p:grpSpPr>
+        <a:xfrm>
+          <a:off x="0" y="0"/>
+          <a:ext cx="0" cy="0"/>
+          <a:chOff x="0" y="0"/>
+          <a:chExt cx="0" cy="0"/>
+        </a:xfrm>
+      </p:grpSpPr>
+      <p:pic>
+        <p:nvPicPr>
+          <p:cNvPr id="2" name="圖片 1">
+            <a:extLst>
+              <a:ext uri="{FF2B5EF4-FFF2-40B4-BE49-F238E27FC236}">
+                <a16:creationId xmlns:a16="http://schemas.microsoft.com/office/drawing/2014/main" id="{E5FED7D8-D387-43B9-AEA5-D1196C8308CB}"/>
+              </a:ext>
+            </a:extLst>
+          </p:cNvPr>
+          <p:cNvPicPr>
+            <a:picLocks noChangeAspect="1"/>
+          </p:cNvPicPr>
+          <p:nvPr/>
+        </p:nvPicPr>
+        <p:blipFill>
+          <a:blip r:embed="rId2"/>
+          <a:stretch>
+            <a:fillRect/>
+          </a:stretch>
+        </p:blipFill>
+        <p:spPr>
+          <a:xfrm>
+            <a:off x="0" y="611521"/>
+            <a:ext cx="12192000" cy="5634958"/>
+          </a:xfrm>
+          <a:prstGeom prst="rect">
+            <a:avLst/>
+          </a:prstGeom>
+        </p:spPr>
+      </p:pic>
+    </p:spTree>
+    <p:extLst>
+      <p:ext uri="{BB962C8B-B14F-4D97-AF65-F5344CB8AC3E}">
+        <p14:creationId xmlns:p14="http://schemas.microsoft.com/office/powerpoint/2010/main" val="2945598644"/>
+      </p:ext>
+    </p:extLst>
+  </p:cSld>
+  <p:clrMapOvr>
+    <a:masterClrMapping/>
+  </p:clrMapOvr>
+</p:sld>
+</file>
+
+<file path=ppt/slides/slide9.xml><?xml version="1.0" encoding="utf-8"?>
+<p:sld xmlns:a="http://schemas.openxmlformats.org/drawingml/2006/main" xmlns:r="http://schemas.openxmlformats.org/officeDocument/2006/relationships" xmlns:p="http://schemas.openxmlformats.org/presentationml/2006/main">
+  <p:cSld>
+    <p:spTree>
+      <p:nvGrpSpPr>
+        <p:cNvPr id="1" name=""/>
+        <p:cNvGrpSpPr/>
+        <p:nvPr/>
+      </p:nvGrpSpPr>
+      <p:grpSpPr>
+        <a:xfrm>
+          <a:off x="0" y="0"/>
+          <a:ext cx="0" cy="0"/>
+          <a:chOff x="0" y="0"/>
+          <a:chExt cx="0" cy="0"/>
+        </a:xfrm>
+      </p:grpSpPr>
+      <p:pic>
+        <p:nvPicPr>
+          <p:cNvPr id="3" name="圖片 2">
+            <a:extLst>
+              <a:ext uri="{FF2B5EF4-FFF2-40B4-BE49-F238E27FC236}">
+                <a16:creationId xmlns:a16="http://schemas.microsoft.com/office/drawing/2014/main" id="{B9A1BFF1-D2DE-4A1C-B15E-852D1FD0FE83}"/>
+              </a:ext>
+            </a:extLst>
+          </p:cNvPr>
+          <p:cNvPicPr>
+            <a:picLocks noChangeAspect="1"/>
+          </p:cNvPicPr>
+          <p:nvPr/>
+        </p:nvPicPr>
+        <p:blipFill>
+          <a:blip r:embed="rId2"/>
+          <a:stretch>
+            <a:fillRect/>
+          </a:stretch>
+        </p:blipFill>
+        <p:spPr>
+          <a:xfrm>
+            <a:off x="0" y="576759"/>
+            <a:ext cx="12192000" cy="5704482"/>
+          </a:xfrm>
+          <a:prstGeom prst="rect">
+            <a:avLst/>
+          </a:prstGeom>
+        </p:spPr>
+      </p:pic>
+    </p:spTree>
+    <p:extLst>
+      <p:ext uri="{BB962C8B-B14F-4D97-AF65-F5344CB8AC3E}">
+        <p14:creationId xmlns:p14="http://schemas.microsoft.com/office/powerpoint/2010/main" val="1551134748"/>
       </p:ext>
     </p:extLst>
   </p:cSld>

</xml_diff>